<commit_message>
Updated presentation - please read description
Added child asthma images (Ted's slide) and moved slide to after Josephs. I thought it would flow better to first look at the general population, and then a closer look at children. Let me know if anyone has other thoughts!
</commit_message>
<xml_diff>
--- a/AdditionalResources/Air Quality and Asthma.pptx
+++ b/AdditionalResources/Air Quality and Asthma.pptx
@@ -13,10 +13,10 @@
     <p:sldId id="257" r:id="rId4"/>
     <p:sldId id="262" r:id="rId5"/>
     <p:sldId id="258" r:id="rId6"/>
-    <p:sldId id="273" r:id="rId7"/>
-    <p:sldId id="268" r:id="rId8"/>
-    <p:sldId id="275" r:id="rId9"/>
-    <p:sldId id="278" r:id="rId10"/>
+    <p:sldId id="268" r:id="rId7"/>
+    <p:sldId id="275" r:id="rId8"/>
+    <p:sldId id="278" r:id="rId9"/>
+    <p:sldId id="273" r:id="rId10"/>
     <p:sldId id="277" r:id="rId11"/>
     <p:sldId id="267" r:id="rId12"/>
     <p:sldId id="261" r:id="rId13"/>
@@ -8277,7 +8277,19 @@
           <a:p>
             <a:r>
               <a:rPr lang="en-US" dirty="0"/>
-              <a:t>Ted</a:t>
+              <a:t>Joseph</a:t>
+            </a:r>
+          </a:p>
+          <a:p>
+            <a:r>
+              <a:rPr lang="en-US" dirty="0"/>
+              <a:t>Urban / rural stats - # good days ratio</a:t>
+            </a:r>
+          </a:p>
+          <a:p>
+            <a:r>
+              <a:rPr lang="en-US" dirty="0"/>
+              <a:t>Good days: not above 50 AQI</a:t>
             </a:r>
           </a:p>
         </p:txBody>
@@ -8308,7 +8320,7 @@
     </p:spTree>
     <p:extLst>
       <p:ext uri="{BB962C8B-B14F-4D97-AF65-F5344CB8AC3E}">
-        <p14:creationId xmlns:p14="http://schemas.microsoft.com/office/powerpoint/2010/main" val="1537271502"/>
+        <p14:creationId xmlns:p14="http://schemas.microsoft.com/office/powerpoint/2010/main" val="1187719279"/>
       </p:ext>
     </p:extLst>
   </p:cSld>
@@ -8368,15 +8380,36 @@
             </a:r>
           </a:p>
           <a:p>
+            <a:endParaRPr lang="en-US" dirty="0"/>
+          </a:p>
+          <a:p>
+            <a:r>
+              <a:rPr lang="en-US" dirty="0" err="1"/>
+              <a:t>Ttest</a:t>
+            </a:r>
             <a:r>
               <a:rPr lang="en-US" dirty="0"/>
-              <a:t>Urban / rural stats - # good days ratio</a:t>
+              <a:t> median AQI between </a:t>
             </a:r>
-          </a:p>
-          <a:p>
+            <a:r>
+              <a:rPr lang="en-US" dirty="0" err="1"/>
+              <a:t>urb</a:t>
+            </a:r>
             <a:r>
               <a:rPr lang="en-US" dirty="0"/>
-              <a:t>Good days: not above 50 AQI</a:t>
+              <a:t> / rural – significant</a:t>
+            </a:r>
+          </a:p>
+          <a:p>
+            <a:r>
+              <a:rPr lang="en-US" dirty="0"/>
+              <a:t>Median value = 37 (rural), 42 (urban)</a:t>
+            </a:r>
+          </a:p>
+          <a:p>
+            <a:r>
+              <a:rPr lang="en-US" dirty="0"/>
+              <a:t>Mean values = 36.79 (rural), 42.35 ( urban)</a:t>
             </a:r>
           </a:p>
         </p:txBody>
@@ -8407,7 +8440,7 @@
     </p:spTree>
     <p:extLst>
       <p:ext uri="{BB962C8B-B14F-4D97-AF65-F5344CB8AC3E}">
-        <p14:creationId xmlns:p14="http://schemas.microsoft.com/office/powerpoint/2010/main" val="1187719279"/>
+        <p14:creationId xmlns:p14="http://schemas.microsoft.com/office/powerpoint/2010/main" val="980072028"/>
       </p:ext>
     </p:extLst>
   </p:cSld>
@@ -8466,39 +8499,6 @@
               <a:t>Joseph</a:t>
             </a:r>
           </a:p>
-          <a:p>
-            <a:endParaRPr lang="en-US" dirty="0"/>
-          </a:p>
-          <a:p>
-            <a:r>
-              <a:rPr lang="en-US" dirty="0" err="1"/>
-              <a:t>Ttest</a:t>
-            </a:r>
-            <a:r>
-              <a:rPr lang="en-US" dirty="0"/>
-              <a:t> median AQI between </a:t>
-            </a:r>
-            <a:r>
-              <a:rPr lang="en-US" dirty="0" err="1"/>
-              <a:t>urb</a:t>
-            </a:r>
-            <a:r>
-              <a:rPr lang="en-US" dirty="0"/>
-              <a:t> / rural – significant</a:t>
-            </a:r>
-          </a:p>
-          <a:p>
-            <a:r>
-              <a:rPr lang="en-US" dirty="0"/>
-              <a:t>Median value = 37 (rural), 42 (urban)</a:t>
-            </a:r>
-          </a:p>
-          <a:p>
-            <a:r>
-              <a:rPr lang="en-US" dirty="0"/>
-              <a:t>Mean values = 36.79 (rural), 42.35 ( urban)</a:t>
-            </a:r>
-          </a:p>
         </p:txBody>
       </p:sp>
       <p:sp>
@@ -8527,7 +8527,7 @@
     </p:spTree>
     <p:extLst>
       <p:ext uri="{BB962C8B-B14F-4D97-AF65-F5344CB8AC3E}">
-        <p14:creationId xmlns:p14="http://schemas.microsoft.com/office/powerpoint/2010/main" val="980072028"/>
+        <p14:creationId xmlns:p14="http://schemas.microsoft.com/office/powerpoint/2010/main" val="2667740634"/>
       </p:ext>
     </p:extLst>
   </p:cSld>
@@ -8583,7 +8583,7 @@
           <a:p>
             <a:r>
               <a:rPr lang="en-US" dirty="0"/>
-              <a:t>Joseph</a:t>
+              <a:t>Ted</a:t>
             </a:r>
           </a:p>
         </p:txBody>
@@ -8614,7 +8614,7 @@
     </p:spTree>
     <p:extLst>
       <p:ext uri="{BB962C8B-B14F-4D97-AF65-F5344CB8AC3E}">
-        <p14:creationId xmlns:p14="http://schemas.microsoft.com/office/powerpoint/2010/main" val="2667740634"/>
+        <p14:creationId xmlns:p14="http://schemas.microsoft.com/office/powerpoint/2010/main" val="1537271502"/>
       </p:ext>
     </p:extLst>
   </p:cSld>
@@ -16001,8 +16001,8 @@
         </p:nvSpPr>
         <p:spPr>
           <a:xfrm>
-            <a:off x="677334" y="1611630"/>
-            <a:ext cx="8596668" cy="4789169"/>
+            <a:off x="677334" y="1463040"/>
+            <a:ext cx="9403926" cy="5223510"/>
           </a:xfrm>
         </p:spPr>
         <p:txBody>
@@ -16030,12 +16030,8 @@
           </a:p>
           <a:p>
             <a:r>
-              <a:rPr lang="en-US" sz="2200" dirty="0">
-                <a:highlight>
-                  <a:srgbClr val="FFFF00"/>
-                </a:highlight>
-              </a:rPr>
-              <a:t>Difference between adults and children</a:t>
+              <a:rPr lang="en-US" sz="2200" dirty="0"/>
+              <a:t>There is not a strong difference between the amount of asthma ER visits for children vs all ages, as a result of air quality.</a:t>
             </a:r>
           </a:p>
         </p:txBody>
@@ -20236,92 +20232,6 @@
           <p:cNvPr id="2" name="Title 1">
             <a:extLst>
               <a:ext uri="{FF2B5EF4-FFF2-40B4-BE49-F238E27FC236}">
-                <a16:creationId xmlns:a16="http://schemas.microsoft.com/office/drawing/2014/main" id="{D1BD4BB5-C1E0-425C-B996-A0B9E1FDE338}"/>
-              </a:ext>
-            </a:extLst>
-          </p:cNvPr>
-          <p:cNvSpPr>
-            <a:spLocks noGrp="1"/>
-          </p:cNvSpPr>
-          <p:nvPr>
-            <p:ph type="title"/>
-          </p:nvPr>
-        </p:nvSpPr>
-        <p:spPr/>
-        <p:txBody>
-          <a:bodyPr/>
-          <a:lstStyle/>
-          <a:p>
-            <a:r>
-              <a:rPr lang="en-US" dirty="0"/>
-              <a:t>A Closer Look at Childhood Asthma</a:t>
-            </a:r>
-          </a:p>
-        </p:txBody>
-      </p:sp>
-      <p:sp>
-        <p:nvSpPr>
-          <p:cNvPr id="5" name="Content Placeholder 4">
-            <a:extLst>
-              <a:ext uri="{FF2B5EF4-FFF2-40B4-BE49-F238E27FC236}">
-                <a16:creationId xmlns:a16="http://schemas.microsoft.com/office/drawing/2014/main" id="{C52A1659-3F06-4903-863A-6904E5098915}"/>
-              </a:ext>
-            </a:extLst>
-          </p:cNvPr>
-          <p:cNvSpPr>
-            <a:spLocks noGrp="1"/>
-          </p:cNvSpPr>
-          <p:nvPr>
-            <p:ph idx="1"/>
-          </p:nvPr>
-        </p:nvSpPr>
-        <p:spPr/>
-        <p:txBody>
-          <a:bodyPr/>
-          <a:lstStyle/>
-          <a:p>
-            <a:r>
-              <a:rPr lang="en-US" dirty="0"/>
-              <a:t>TED WILL SEND CHART AND OBSERVATION</a:t>
-            </a:r>
-          </a:p>
-        </p:txBody>
-      </p:sp>
-    </p:spTree>
-    <p:extLst>
-      <p:ext uri="{BB962C8B-B14F-4D97-AF65-F5344CB8AC3E}">
-        <p14:creationId xmlns:p14="http://schemas.microsoft.com/office/powerpoint/2010/main" val="3258836976"/>
-      </p:ext>
-    </p:extLst>
-  </p:cSld>
-  <p:clrMapOvr>
-    <a:masterClrMapping/>
-  </p:clrMapOvr>
-</p:sld>
-</file>
-
-<file path=ppt/slides/slide7.xml><?xml version="1.0" encoding="utf-8"?>
-<p:sld xmlns:a="http://schemas.openxmlformats.org/drawingml/2006/main" xmlns:r="http://schemas.openxmlformats.org/officeDocument/2006/relationships" xmlns:p="http://schemas.openxmlformats.org/presentationml/2006/main">
-  <p:cSld>
-    <p:spTree>
-      <p:nvGrpSpPr>
-        <p:cNvPr id="1" name=""/>
-        <p:cNvGrpSpPr/>
-        <p:nvPr/>
-      </p:nvGrpSpPr>
-      <p:grpSpPr>
-        <a:xfrm>
-          <a:off x="0" y="0"/>
-          <a:ext cx="0" cy="0"/>
-          <a:chOff x="0" y="0"/>
-          <a:chExt cx="0" cy="0"/>
-        </a:xfrm>
-      </p:grpSpPr>
-      <p:sp>
-        <p:nvSpPr>
-          <p:cNvPr id="2" name="Title 1">
-            <a:extLst>
-              <a:ext uri="{FF2B5EF4-FFF2-40B4-BE49-F238E27FC236}">
                 <a16:creationId xmlns:a16="http://schemas.microsoft.com/office/drawing/2014/main" id="{F7FD17BE-6D83-4023-BBF3-4361917A8D60}"/>
               </a:ext>
             </a:extLst>
@@ -20588,7 +20498,7 @@
 </p:sld>
 </file>
 
-<file path=ppt/slides/slide8.xml><?xml version="1.0" encoding="utf-8"?>
+<file path=ppt/slides/slide7.xml><?xml version="1.0" encoding="utf-8"?>
 <p:sld xmlns:a="http://schemas.openxmlformats.org/drawingml/2006/main" xmlns:r="http://schemas.openxmlformats.org/officeDocument/2006/relationships" xmlns:p="http://schemas.openxmlformats.org/presentationml/2006/main">
   <p:cSld>
     <p:spTree>
@@ -20785,7 +20695,7 @@
 </p:sld>
 </file>
 
-<file path=ppt/slides/slide9.xml><?xml version="1.0" encoding="utf-8"?>
+<file path=ppt/slides/slide8.xml><?xml version="1.0" encoding="utf-8"?>
 <p:sld xmlns:a="http://schemas.openxmlformats.org/drawingml/2006/main" xmlns:r="http://schemas.openxmlformats.org/officeDocument/2006/relationships" xmlns:p="http://schemas.openxmlformats.org/presentationml/2006/main">
   <p:cSld>
     <p:spTree>
@@ -20945,6 +20855,312 @@
                                         <p:cTn id="7" dur="500"/>
                                         <p:tgtEl>
                                           <p:spTgt spid="7170"/>
+                                        </p:tgtEl>
+                                      </p:cBhvr>
+                                    </p:animEffect>
+                                  </p:childTnLst>
+                                </p:cTn>
+                              </p:par>
+                            </p:childTnLst>
+                          </p:cTn>
+                        </p:par>
+                      </p:childTnLst>
+                    </p:cTn>
+                  </p:par>
+                </p:childTnLst>
+              </p:cTn>
+              <p:prevCondLst>
+                <p:cond evt="onPrev" delay="0">
+                  <p:tgtEl>
+                    <p:sldTgt/>
+                  </p:tgtEl>
+                </p:cond>
+              </p:prevCondLst>
+              <p:nextCondLst>
+                <p:cond evt="onNext" delay="0">
+                  <p:tgtEl>
+                    <p:sldTgt/>
+                  </p:tgtEl>
+                </p:cond>
+              </p:nextCondLst>
+            </p:seq>
+          </p:childTnLst>
+        </p:cTn>
+      </p:par>
+    </p:tnLst>
+  </p:timing>
+</p:sld>
+</file>
+
+<file path=ppt/slides/slide9.xml><?xml version="1.0" encoding="utf-8"?>
+<p:sld xmlns:a="http://schemas.openxmlformats.org/drawingml/2006/main" xmlns:r="http://schemas.openxmlformats.org/officeDocument/2006/relationships" xmlns:p="http://schemas.openxmlformats.org/presentationml/2006/main">
+  <p:cSld>
+    <p:spTree>
+      <p:nvGrpSpPr>
+        <p:cNvPr id="1" name=""/>
+        <p:cNvGrpSpPr/>
+        <p:nvPr/>
+      </p:nvGrpSpPr>
+      <p:grpSpPr>
+        <a:xfrm>
+          <a:off x="0" y="0"/>
+          <a:ext cx="0" cy="0"/>
+          <a:chOff x="0" y="0"/>
+          <a:chExt cx="0" cy="0"/>
+        </a:xfrm>
+      </p:grpSpPr>
+      <p:sp>
+        <p:nvSpPr>
+          <p:cNvPr id="2" name="Title 1">
+            <a:extLst>
+              <a:ext uri="{FF2B5EF4-FFF2-40B4-BE49-F238E27FC236}">
+                <a16:creationId xmlns:a16="http://schemas.microsoft.com/office/drawing/2014/main" id="{D1BD4BB5-C1E0-425C-B996-A0B9E1FDE338}"/>
+              </a:ext>
+            </a:extLst>
+          </p:cNvPr>
+          <p:cNvSpPr>
+            <a:spLocks noGrp="1"/>
+          </p:cNvSpPr>
+          <p:nvPr>
+            <p:ph type="title"/>
+          </p:nvPr>
+        </p:nvSpPr>
+        <p:spPr/>
+        <p:txBody>
+          <a:bodyPr/>
+          <a:lstStyle/>
+          <a:p>
+            <a:r>
+              <a:rPr lang="en-US" dirty="0"/>
+              <a:t>A Closer Look at Childhood Asthma Visits</a:t>
+            </a:r>
+          </a:p>
+        </p:txBody>
+      </p:sp>
+      <p:pic>
+        <p:nvPicPr>
+          <p:cNvPr id="1026" name="Picture 2" descr="totalsChildrenTGoodDaysByTDays_vs_erAsthmaVisits_2017.png">
+            <a:extLst>
+              <a:ext uri="{FF2B5EF4-FFF2-40B4-BE49-F238E27FC236}">
+                <a16:creationId xmlns:a16="http://schemas.microsoft.com/office/drawing/2014/main" id="{447C718F-BE53-4A43-9F1A-697C19CBC962}"/>
+              </a:ext>
+            </a:extLst>
+          </p:cNvPr>
+          <p:cNvPicPr>
+            <a:picLocks noChangeAspect="1" noChangeArrowheads="1"/>
+          </p:cNvPicPr>
+          <p:nvPr/>
+        </p:nvPicPr>
+        <p:blipFill>
+          <a:blip r:embed="rId3">
+            <a:extLst>
+              <a:ext uri="{28A0092B-C50C-407E-A947-70E740481C1C}">
+                <a14:useLocalDpi xmlns:a14="http://schemas.microsoft.com/office/drawing/2010/main" val="0"/>
+              </a:ext>
+            </a:extLst>
+          </a:blip>
+          <a:srcRect/>
+          <a:stretch>
+            <a:fillRect/>
+          </a:stretch>
+        </p:blipFill>
+        <p:spPr bwMode="auto">
+          <a:xfrm>
+            <a:off x="140124" y="1672547"/>
+            <a:ext cx="5875866" cy="4104249"/>
+          </a:xfrm>
+          <a:prstGeom prst="rect">
+            <a:avLst/>
+          </a:prstGeom>
+          <a:ln>
+            <a:noFill/>
+          </a:ln>
+          <a:effectLst>
+            <a:outerShdw blurRad="292100" dist="139700" dir="2700000" algn="tl" rotWithShape="0">
+              <a:srgbClr val="333333">
+                <a:alpha val="65000"/>
+              </a:srgbClr>
+            </a:outerShdw>
+          </a:effectLst>
+          <a:extLst>
+            <a:ext uri="{909E8E84-426E-40DD-AFC4-6F175D3DCCD1}">
+              <a14:hiddenFill xmlns:a14="http://schemas.microsoft.com/office/drawing/2010/main">
+                <a:solidFill>
+                  <a:srgbClr val="FFFFFF"/>
+                </a:solidFill>
+              </a14:hiddenFill>
+            </a:ext>
+          </a:extLst>
+        </p:spPr>
+      </p:pic>
+      <p:pic>
+        <p:nvPicPr>
+          <p:cNvPr id="1028" name="Picture 4" descr="totalsChildrenMAQIDays_vs_erAsthmaVisits_2017.png">
+            <a:extLst>
+              <a:ext uri="{FF2B5EF4-FFF2-40B4-BE49-F238E27FC236}">
+                <a16:creationId xmlns:a16="http://schemas.microsoft.com/office/drawing/2014/main" id="{5F49AF43-824E-43EC-B7DB-4C18C10A5F82}"/>
+              </a:ext>
+            </a:extLst>
+          </p:cNvPr>
+          <p:cNvPicPr>
+            <a:picLocks noChangeAspect="1" noChangeArrowheads="1"/>
+          </p:cNvPicPr>
+          <p:nvPr/>
+        </p:nvPicPr>
+        <p:blipFill>
+          <a:blip r:embed="rId4">
+            <a:extLst>
+              <a:ext uri="{28A0092B-C50C-407E-A947-70E740481C1C}">
+                <a14:useLocalDpi xmlns:a14="http://schemas.microsoft.com/office/drawing/2010/main" val="0"/>
+              </a:ext>
+            </a:extLst>
+          </a:blip>
+          <a:srcRect/>
+          <a:stretch>
+            <a:fillRect/>
+          </a:stretch>
+        </p:blipFill>
+        <p:spPr bwMode="auto">
+          <a:xfrm>
+            <a:off x="6187440" y="1672547"/>
+            <a:ext cx="5875867" cy="4104249"/>
+          </a:xfrm>
+          <a:prstGeom prst="rect">
+            <a:avLst/>
+          </a:prstGeom>
+          <a:ln>
+            <a:noFill/>
+          </a:ln>
+          <a:effectLst>
+            <a:outerShdw blurRad="292100" dist="139700" dir="2700000" algn="tl" rotWithShape="0">
+              <a:srgbClr val="333333">
+                <a:alpha val="65000"/>
+              </a:srgbClr>
+            </a:outerShdw>
+          </a:effectLst>
+          <a:extLst>
+            <a:ext uri="{909E8E84-426E-40DD-AFC4-6F175D3DCCD1}">
+              <a14:hiddenFill xmlns:a14="http://schemas.microsoft.com/office/drawing/2010/main">
+                <a:solidFill>
+                  <a:srgbClr val="FFFFFF"/>
+                </a:solidFill>
+              </a14:hiddenFill>
+            </a:ext>
+          </a:extLst>
+        </p:spPr>
+      </p:pic>
+    </p:spTree>
+    <p:extLst>
+      <p:ext uri="{BB962C8B-B14F-4D97-AF65-F5344CB8AC3E}">
+        <p14:creationId xmlns:p14="http://schemas.microsoft.com/office/powerpoint/2010/main" val="3258836976"/>
+      </p:ext>
+    </p:extLst>
+  </p:cSld>
+  <p:clrMapOvr>
+    <a:masterClrMapping/>
+  </p:clrMapOvr>
+  <p:timing>
+    <p:tnLst>
+      <p:par>
+        <p:cTn id="1" dur="indefinite" restart="never" nodeType="tmRoot">
+          <p:childTnLst>
+            <p:seq concurrent="1" nextAc="seek">
+              <p:cTn id="2" dur="indefinite" nodeType="mainSeq">
+                <p:childTnLst>
+                  <p:par>
+                    <p:cTn id="3" fill="hold">
+                      <p:stCondLst>
+                        <p:cond delay="indefinite"/>
+                      </p:stCondLst>
+                      <p:childTnLst>
+                        <p:par>
+                          <p:cTn id="4" fill="hold">
+                            <p:stCondLst>
+                              <p:cond delay="0"/>
+                            </p:stCondLst>
+                            <p:childTnLst>
+                              <p:par>
+                                <p:cTn id="5" presetID="10" presetClass="entr" presetSubtype="0" fill="hold" nodeType="clickEffect">
+                                  <p:stCondLst>
+                                    <p:cond delay="0"/>
+                                  </p:stCondLst>
+                                  <p:childTnLst>
+                                    <p:set>
+                                      <p:cBhvr>
+                                        <p:cTn id="6" dur="1" fill="hold">
+                                          <p:stCondLst>
+                                            <p:cond delay="0"/>
+                                          </p:stCondLst>
+                                        </p:cTn>
+                                        <p:tgtEl>
+                                          <p:spTgt spid="1026"/>
+                                        </p:tgtEl>
+                                        <p:attrNameLst>
+                                          <p:attrName>style.visibility</p:attrName>
+                                        </p:attrNameLst>
+                                      </p:cBhvr>
+                                      <p:to>
+                                        <p:strVal val="visible"/>
+                                      </p:to>
+                                    </p:set>
+                                    <p:animEffect transition="in" filter="fade">
+                                      <p:cBhvr>
+                                        <p:cTn id="7" dur="500"/>
+                                        <p:tgtEl>
+                                          <p:spTgt spid="1026"/>
+                                        </p:tgtEl>
+                                      </p:cBhvr>
+                                    </p:animEffect>
+                                  </p:childTnLst>
+                                </p:cTn>
+                              </p:par>
+                            </p:childTnLst>
+                          </p:cTn>
+                        </p:par>
+                      </p:childTnLst>
+                    </p:cTn>
+                  </p:par>
+                  <p:par>
+                    <p:cTn id="8" fill="hold">
+                      <p:stCondLst>
+                        <p:cond delay="indefinite"/>
+                      </p:stCondLst>
+                      <p:childTnLst>
+                        <p:par>
+                          <p:cTn id="9" fill="hold">
+                            <p:stCondLst>
+                              <p:cond delay="0"/>
+                            </p:stCondLst>
+                            <p:childTnLst>
+                              <p:par>
+                                <p:cTn id="10" presetID="10" presetClass="entr" presetSubtype="0" fill="hold" nodeType="clickEffect">
+                                  <p:stCondLst>
+                                    <p:cond delay="0"/>
+                                  </p:stCondLst>
+                                  <p:childTnLst>
+                                    <p:set>
+                                      <p:cBhvr>
+                                        <p:cTn id="11" dur="1" fill="hold">
+                                          <p:stCondLst>
+                                            <p:cond delay="0"/>
+                                          </p:stCondLst>
+                                        </p:cTn>
+                                        <p:tgtEl>
+                                          <p:spTgt spid="1028"/>
+                                        </p:tgtEl>
+                                        <p:attrNameLst>
+                                          <p:attrName>style.visibility</p:attrName>
+                                        </p:attrNameLst>
+                                      </p:cBhvr>
+                                      <p:to>
+                                        <p:strVal val="visible"/>
+                                      </p:to>
+                                    </p:set>
+                                    <p:animEffect transition="in" filter="fade">
+                                      <p:cBhvr>
+                                        <p:cTn id="12" dur="500"/>
+                                        <p:tgtEl>
+                                          <p:spTgt spid="1028"/>
                                         </p:tgtEl>
                                       </p:cBhvr>
                                     </p:animEffect>

</xml_diff>